<commit_message>
Added: Generic business layer.
</commit_message>
<xml_diff>
--- a/Database.pptx
+++ b/Database.pptx
@@ -104,6 +104,11 @@
       </a:defRPr>
     </a:lvl9pPr>
   </p:defaultTextStyle>
+  <p:extLst>
+    <p:ext uri="{EFAFB233-063F-42B5-8137-9DF3F51BA10A}">
+      <p15:sldGuideLst xmlns:p15="http://schemas.microsoft.com/office/powerpoint/2012/main"/>
+    </p:ext>
+  </p:extLst>
 </p:presentation>
 </file>
 
@@ -238,7 +243,7 @@
           <a:p>
             <a:fld id="{106A7CB6-F7CB-4AB3-884B-59E1B47A4170}" type="datetimeFigureOut">
               <a:rPr lang="fr-FR" smtClean="0"/>
-              <a:t>22/12/2016</a:t>
+              <a:t>23/12/2016</a:t>
             </a:fld>
             <a:endParaRPr lang="fr-FR"/>
           </a:p>
@@ -408,7 +413,7 @@
           <a:p>
             <a:fld id="{106A7CB6-F7CB-4AB3-884B-59E1B47A4170}" type="datetimeFigureOut">
               <a:rPr lang="fr-FR" smtClean="0"/>
-              <a:t>22/12/2016</a:t>
+              <a:t>23/12/2016</a:t>
             </a:fld>
             <a:endParaRPr lang="fr-FR"/>
           </a:p>
@@ -588,7 +593,7 @@
           <a:p>
             <a:fld id="{106A7CB6-F7CB-4AB3-884B-59E1B47A4170}" type="datetimeFigureOut">
               <a:rPr lang="fr-FR" smtClean="0"/>
-              <a:t>22/12/2016</a:t>
+              <a:t>23/12/2016</a:t>
             </a:fld>
             <a:endParaRPr lang="fr-FR"/>
           </a:p>
@@ -758,7 +763,7 @@
           <a:p>
             <a:fld id="{106A7CB6-F7CB-4AB3-884B-59E1B47A4170}" type="datetimeFigureOut">
               <a:rPr lang="fr-FR" smtClean="0"/>
-              <a:t>22/12/2016</a:t>
+              <a:t>23/12/2016</a:t>
             </a:fld>
             <a:endParaRPr lang="fr-FR"/>
           </a:p>
@@ -1004,7 +1009,7 @@
           <a:p>
             <a:fld id="{106A7CB6-F7CB-4AB3-884B-59E1B47A4170}" type="datetimeFigureOut">
               <a:rPr lang="fr-FR" smtClean="0"/>
-              <a:t>22/12/2016</a:t>
+              <a:t>23/12/2016</a:t>
             </a:fld>
             <a:endParaRPr lang="fr-FR"/>
           </a:p>
@@ -1236,7 +1241,7 @@
           <a:p>
             <a:fld id="{106A7CB6-F7CB-4AB3-884B-59E1B47A4170}" type="datetimeFigureOut">
               <a:rPr lang="fr-FR" smtClean="0"/>
-              <a:t>22/12/2016</a:t>
+              <a:t>23/12/2016</a:t>
             </a:fld>
             <a:endParaRPr lang="fr-FR"/>
           </a:p>
@@ -1603,7 +1608,7 @@
           <a:p>
             <a:fld id="{106A7CB6-F7CB-4AB3-884B-59E1B47A4170}" type="datetimeFigureOut">
               <a:rPr lang="fr-FR" smtClean="0"/>
-              <a:t>22/12/2016</a:t>
+              <a:t>23/12/2016</a:t>
             </a:fld>
             <a:endParaRPr lang="fr-FR"/>
           </a:p>
@@ -1721,7 +1726,7 @@
           <a:p>
             <a:fld id="{106A7CB6-F7CB-4AB3-884B-59E1B47A4170}" type="datetimeFigureOut">
               <a:rPr lang="fr-FR" smtClean="0"/>
-              <a:t>22/12/2016</a:t>
+              <a:t>23/12/2016</a:t>
             </a:fld>
             <a:endParaRPr lang="fr-FR"/>
           </a:p>
@@ -1816,7 +1821,7 @@
           <a:p>
             <a:fld id="{106A7CB6-F7CB-4AB3-884B-59E1B47A4170}" type="datetimeFigureOut">
               <a:rPr lang="fr-FR" smtClean="0"/>
-              <a:t>22/12/2016</a:t>
+              <a:t>23/12/2016</a:t>
             </a:fld>
             <a:endParaRPr lang="fr-FR"/>
           </a:p>
@@ -2093,7 +2098,7 @@
           <a:p>
             <a:fld id="{106A7CB6-F7CB-4AB3-884B-59E1B47A4170}" type="datetimeFigureOut">
               <a:rPr lang="fr-FR" smtClean="0"/>
-              <a:t>22/12/2016</a:t>
+              <a:t>23/12/2016</a:t>
             </a:fld>
             <a:endParaRPr lang="fr-FR"/>
           </a:p>
@@ -2346,7 +2351,7 @@
           <a:p>
             <a:fld id="{106A7CB6-F7CB-4AB3-884B-59E1B47A4170}" type="datetimeFigureOut">
               <a:rPr lang="fr-FR" smtClean="0"/>
-              <a:t>22/12/2016</a:t>
+              <a:t>23/12/2016</a:t>
             </a:fld>
             <a:endParaRPr lang="fr-FR"/>
           </a:p>
@@ -2559,7 +2564,7 @@
           <a:p>
             <a:fld id="{106A7CB6-F7CB-4AB3-884B-59E1B47A4170}" type="datetimeFigureOut">
               <a:rPr lang="fr-FR" smtClean="0"/>
-              <a:t>22/12/2016</a:t>
+              <a:t>23/12/2016</a:t>
             </a:fld>
             <a:endParaRPr lang="fr-FR"/>
           </a:p>
@@ -2950,6 +2955,14 @@
 <file path=ppt/slides/slide1.xml><?xml version="1.0" encoding="utf-8"?>
 <p:sld xmlns:a="http://schemas.openxmlformats.org/drawingml/2006/main" xmlns:r="http://schemas.openxmlformats.org/officeDocument/2006/relationships" xmlns:p="http://schemas.openxmlformats.org/presentationml/2006/main">
   <p:cSld>
+    <p:bg>
+      <p:bgPr>
+        <a:solidFill>
+          <a:schemeClr val="tx1"/>
+        </a:solidFill>
+        <a:effectLst/>
+      </p:bgPr>
+    </p:bg>
     <p:spTree>
       <p:nvGrpSpPr>
         <p:cNvPr id="1" name=""/>
@@ -3039,7 +3052,11 @@
               <a:buChar char="•"/>
             </a:pPr>
             <a:r>
-              <a:rPr lang="fr-FR" sz="1100" smtClean="0"/>
+              <a:rPr lang="fr-FR" sz="1100" smtClean="0">
+                <a:solidFill>
+                  <a:schemeClr val="bg1"/>
+                </a:solidFill>
+              </a:rPr>
               <a:t>PartNumber</a:t>
             </a:r>
           </a:p>
@@ -3049,7 +3066,11 @@
               <a:buChar char="•"/>
             </a:pPr>
             <a:r>
-              <a:rPr lang="fr-FR" sz="1100" smtClean="0"/>
+              <a:rPr lang="fr-FR" sz="1100" smtClean="0">
+                <a:solidFill>
+                  <a:schemeClr val="bg1"/>
+                </a:solidFill>
+              </a:rPr>
               <a:t>Manufacturer</a:t>
             </a:r>
           </a:p>
@@ -3059,7 +3080,11 @@
               <a:buChar char="•"/>
             </a:pPr>
             <a:r>
-              <a:rPr lang="fr-FR" sz="1100" smtClean="0"/>
+              <a:rPr lang="fr-FR" sz="1100" smtClean="0">
+                <a:solidFill>
+                  <a:schemeClr val="bg1"/>
+                </a:solidFill>
+              </a:rPr>
               <a:t>Name</a:t>
             </a:r>
           </a:p>
@@ -3069,7 +3094,11 @@
               <a:buChar char="•"/>
             </a:pPr>
             <a:r>
-              <a:rPr lang="fr-FR" sz="1100" smtClean="0"/>
+              <a:rPr lang="fr-FR" sz="1100" smtClean="0">
+                <a:solidFill>
+                  <a:schemeClr val="bg1"/>
+                </a:solidFill>
+              </a:rPr>
               <a:t>Type</a:t>
             </a:r>
           </a:p>
@@ -3079,11 +3108,19 @@
               <a:buChar char="•"/>
             </a:pPr>
             <a:r>
-              <a:rPr lang="fr-FR" sz="1100" smtClean="0"/>
+              <a:rPr lang="fr-FR" sz="1100" smtClean="0">
+                <a:solidFill>
+                  <a:schemeClr val="bg1"/>
+                </a:solidFill>
+              </a:rPr>
               <a:t>Ata</a:t>
             </a:r>
             <a:r>
-              <a:rPr lang="fr-FR" sz="1100" baseline="30000" smtClean="0"/>
+              <a:rPr lang="fr-FR" sz="1100" baseline="30000" smtClean="0">
+                <a:solidFill>
+                  <a:schemeClr val="bg1"/>
+                </a:solidFill>
+              </a:rPr>
               <a:t>(int)</a:t>
             </a:r>
           </a:p>
@@ -3093,7 +3130,11 @@
               <a:buChar char="•"/>
             </a:pPr>
             <a:r>
-              <a:rPr lang="fr-FR" sz="1100" smtClean="0"/>
+              <a:rPr lang="fr-FR" sz="1100" smtClean="0">
+                <a:solidFill>
+                  <a:schemeClr val="bg1"/>
+                </a:solidFill>
+              </a:rPr>
               <a:t>ActivityField</a:t>
             </a:r>
           </a:p>
@@ -3103,7 +3144,11 @@
               <a:buChar char="•"/>
             </a:pPr>
             <a:r>
-              <a:rPr lang="fr-FR" sz="1100" smtClean="0"/>
+              <a:rPr lang="fr-FR" sz="1100" smtClean="0">
+                <a:solidFill>
+                  <a:schemeClr val="bg1"/>
+                </a:solidFill>
+              </a:rPr>
               <a:t>MechanicsGroup</a:t>
             </a:r>
           </a:p>
@@ -3113,7 +3158,11 @@
               <a:buChar char="•"/>
             </a:pPr>
             <a:r>
-              <a:rPr lang="fr-FR" sz="1100" smtClean="0"/>
+              <a:rPr lang="fr-FR" sz="1100" smtClean="0">
+                <a:solidFill>
+                  <a:schemeClr val="bg1"/>
+                </a:solidFill>
+              </a:rPr>
               <a:t>DocumentsReference</a:t>
             </a:r>
           </a:p>
@@ -3124,6 +3173,9 @@
             </a:pPr>
             <a:r>
               <a:rPr lang="fr-FR" sz="1100" smtClean="0">
+                <a:solidFill>
+                  <a:schemeClr val="bg1"/>
+                </a:solidFill>
                 <a:sym typeface="Wingdings" panose="05000000000000000000" pitchFamily="2" charset="2"/>
               </a:rPr>
               <a:t>DocumentsPartNumber</a:t>
@@ -3157,11 +3209,6 @@
               </a:rPr>
               <a:t>EquipmentMonitoring</a:t>
             </a:r>
-            <a:endParaRPr lang="fr-FR" sz="1100" smtClean="0">
-              <a:solidFill>
-                <a:srgbClr val="FF0000"/>
-              </a:solidFill>
-            </a:endParaRPr>
           </a:p>
         </p:txBody>
       </p:sp>
@@ -3240,7 +3287,11 @@
               <a:buChar char="•"/>
             </a:pPr>
             <a:r>
-              <a:rPr lang="fr-FR" sz="1100" smtClean="0"/>
+              <a:rPr lang="fr-FR" sz="1100" smtClean="0">
+                <a:solidFill>
+                  <a:schemeClr val="bg1"/>
+                </a:solidFill>
+              </a:rPr>
               <a:t>Description</a:t>
             </a:r>
           </a:p>
@@ -3321,7 +3372,11 @@
               <a:buChar char="•"/>
             </a:pPr>
             <a:r>
-              <a:rPr lang="fr-FR" sz="1100" smtClean="0"/>
+              <a:rPr lang="fr-FR" sz="1100" smtClean="0">
+                <a:solidFill>
+                  <a:schemeClr val="bg1"/>
+                </a:solidFill>
+              </a:rPr>
               <a:t>Name</a:t>
             </a:r>
           </a:p>
@@ -3416,7 +3471,11 @@
               <a:buChar char="•"/>
             </a:pPr>
             <a:r>
-              <a:rPr lang="fr-FR" sz="1100" smtClean="0"/>
+              <a:rPr lang="fr-FR" sz="1100" smtClean="0">
+                <a:solidFill>
+                  <a:schemeClr val="bg1"/>
+                </a:solidFill>
+              </a:rPr>
               <a:t>Date</a:t>
             </a:r>
           </a:p>
@@ -3511,7 +3570,11 @@
               <a:buChar char="•"/>
             </a:pPr>
             <a:r>
-              <a:rPr lang="fr-FR" sz="1100" smtClean="0"/>
+              <a:rPr lang="fr-FR" sz="1100" smtClean="0">
+                <a:solidFill>
+                  <a:schemeClr val="bg1"/>
+                </a:solidFill>
+              </a:rPr>
               <a:t>FamilyName</a:t>
             </a:r>
           </a:p>
@@ -3521,7 +3584,11 @@
               <a:buChar char="•"/>
             </a:pPr>
             <a:r>
-              <a:rPr lang="fr-FR" sz="1100" smtClean="0"/>
+              <a:rPr lang="fr-FR" sz="1100" smtClean="0">
+                <a:solidFill>
+                  <a:schemeClr val="bg1"/>
+                </a:solidFill>
+              </a:rPr>
               <a:t>FirstName</a:t>
             </a:r>
           </a:p>
@@ -3531,7 +3598,11 @@
               <a:buChar char="•"/>
             </a:pPr>
             <a:r>
-              <a:rPr lang="fr-FR" sz="1100" smtClean="0"/>
+              <a:rPr lang="fr-FR" sz="1100" smtClean="0">
+                <a:solidFill>
+                  <a:schemeClr val="bg1"/>
+                </a:solidFill>
+              </a:rPr>
               <a:t>UserName</a:t>
             </a:r>
           </a:p>
@@ -3541,7 +3612,11 @@
               <a:buChar char="•"/>
             </a:pPr>
             <a:r>
-              <a:rPr lang="fr-FR" sz="1100" smtClean="0"/>
+              <a:rPr lang="fr-FR" sz="1100" smtClean="0">
+                <a:solidFill>
+                  <a:schemeClr val="bg1"/>
+                </a:solidFill>
+              </a:rPr>
               <a:t>Password</a:t>
             </a:r>
           </a:p>
@@ -3874,6 +3949,13 @@
   <p:clrMapOvr>
     <a:masterClrMapping/>
   </p:clrMapOvr>
+  <p:timing>
+    <p:tnLst>
+      <p:par>
+        <p:cTn id="1" dur="indefinite" restart="never" nodeType="tmRoot"/>
+      </p:par>
+    </p:tnLst>
+  </p:timing>
 </p:sld>
 </file>
 

</xml_diff>

<commit_message>
Updated: Equipment view models and controler.
</commit_message>
<xml_diff>
--- a/Database.pptx
+++ b/Database.pptx
@@ -243,7 +243,7 @@
           <a:p>
             <a:fld id="{106A7CB6-F7CB-4AB3-884B-59E1B47A4170}" type="datetimeFigureOut">
               <a:rPr lang="fr-FR" smtClean="0"/>
-              <a:t>23/12/2016</a:t>
+              <a:t>08/01/2017</a:t>
             </a:fld>
             <a:endParaRPr lang="fr-FR"/>
           </a:p>
@@ -413,7 +413,7 @@
           <a:p>
             <a:fld id="{106A7CB6-F7CB-4AB3-884B-59E1B47A4170}" type="datetimeFigureOut">
               <a:rPr lang="fr-FR" smtClean="0"/>
-              <a:t>23/12/2016</a:t>
+              <a:t>08/01/2017</a:t>
             </a:fld>
             <a:endParaRPr lang="fr-FR"/>
           </a:p>
@@ -593,7 +593,7 @@
           <a:p>
             <a:fld id="{106A7CB6-F7CB-4AB3-884B-59E1B47A4170}" type="datetimeFigureOut">
               <a:rPr lang="fr-FR" smtClean="0"/>
-              <a:t>23/12/2016</a:t>
+              <a:t>08/01/2017</a:t>
             </a:fld>
             <a:endParaRPr lang="fr-FR"/>
           </a:p>
@@ -763,7 +763,7 @@
           <a:p>
             <a:fld id="{106A7CB6-F7CB-4AB3-884B-59E1B47A4170}" type="datetimeFigureOut">
               <a:rPr lang="fr-FR" smtClean="0"/>
-              <a:t>23/12/2016</a:t>
+              <a:t>08/01/2017</a:t>
             </a:fld>
             <a:endParaRPr lang="fr-FR"/>
           </a:p>
@@ -1009,7 +1009,7 @@
           <a:p>
             <a:fld id="{106A7CB6-F7CB-4AB3-884B-59E1B47A4170}" type="datetimeFigureOut">
               <a:rPr lang="fr-FR" smtClean="0"/>
-              <a:t>23/12/2016</a:t>
+              <a:t>08/01/2017</a:t>
             </a:fld>
             <a:endParaRPr lang="fr-FR"/>
           </a:p>
@@ -1241,7 +1241,7 @@
           <a:p>
             <a:fld id="{106A7CB6-F7CB-4AB3-884B-59E1B47A4170}" type="datetimeFigureOut">
               <a:rPr lang="fr-FR" smtClean="0"/>
-              <a:t>23/12/2016</a:t>
+              <a:t>08/01/2017</a:t>
             </a:fld>
             <a:endParaRPr lang="fr-FR"/>
           </a:p>
@@ -1608,7 +1608,7 @@
           <a:p>
             <a:fld id="{106A7CB6-F7CB-4AB3-884B-59E1B47A4170}" type="datetimeFigureOut">
               <a:rPr lang="fr-FR" smtClean="0"/>
-              <a:t>23/12/2016</a:t>
+              <a:t>08/01/2017</a:t>
             </a:fld>
             <a:endParaRPr lang="fr-FR"/>
           </a:p>
@@ -1726,7 +1726,7 @@
           <a:p>
             <a:fld id="{106A7CB6-F7CB-4AB3-884B-59E1B47A4170}" type="datetimeFigureOut">
               <a:rPr lang="fr-FR" smtClean="0"/>
-              <a:t>23/12/2016</a:t>
+              <a:t>08/01/2017</a:t>
             </a:fld>
             <a:endParaRPr lang="fr-FR"/>
           </a:p>
@@ -1821,7 +1821,7 @@
           <a:p>
             <a:fld id="{106A7CB6-F7CB-4AB3-884B-59E1B47A4170}" type="datetimeFigureOut">
               <a:rPr lang="fr-FR" smtClean="0"/>
-              <a:t>23/12/2016</a:t>
+              <a:t>08/01/2017</a:t>
             </a:fld>
             <a:endParaRPr lang="fr-FR"/>
           </a:p>
@@ -2098,7 +2098,7 @@
           <a:p>
             <a:fld id="{106A7CB6-F7CB-4AB3-884B-59E1B47A4170}" type="datetimeFigureOut">
               <a:rPr lang="fr-FR" smtClean="0"/>
-              <a:t>23/12/2016</a:t>
+              <a:t>08/01/2017</a:t>
             </a:fld>
             <a:endParaRPr lang="fr-FR"/>
           </a:p>
@@ -2351,7 +2351,7 @@
           <a:p>
             <a:fld id="{106A7CB6-F7CB-4AB3-884B-59E1B47A4170}" type="datetimeFigureOut">
               <a:rPr lang="fr-FR" smtClean="0"/>
-              <a:t>23/12/2016</a:t>
+              <a:t>08/01/2017</a:t>
             </a:fld>
             <a:endParaRPr lang="fr-FR"/>
           </a:p>
@@ -2564,7 +2564,7 @@
           <a:p>
             <a:fld id="{106A7CB6-F7CB-4AB3-884B-59E1B47A4170}" type="datetimeFigureOut">
               <a:rPr lang="fr-FR" smtClean="0"/>
-              <a:t>23/12/2016</a:t>
+              <a:t>08/01/2017</a:t>
             </a:fld>
             <a:endParaRPr lang="fr-FR"/>
           </a:p>
@@ -2985,8 +2985,8 @@
         </p:nvSpPr>
         <p:spPr>
           <a:xfrm>
-            <a:off x="6128950" y="1341581"/>
-            <a:ext cx="1746421" cy="261610"/>
+            <a:off x="3366700" y="174173"/>
+            <a:ext cx="1967295" cy="261610"/>
           </a:xfrm>
           <a:prstGeom prst="rect">
             <a:avLst/>
@@ -3026,8 +3026,8 @@
         </p:nvSpPr>
         <p:spPr>
           <a:xfrm>
-            <a:off x="6128949" y="1603191"/>
-            <a:ext cx="1746421" cy="1954381"/>
+            <a:off x="3366699" y="435783"/>
+            <a:ext cx="1967296" cy="2462213"/>
           </a:xfrm>
           <a:prstGeom prst="rect">
             <a:avLst/>
@@ -3052,12 +3052,12 @@
               <a:buChar char="•"/>
             </a:pPr>
             <a:r>
-              <a:rPr lang="fr-FR" sz="1100" smtClean="0">
-                <a:solidFill>
-                  <a:schemeClr val="bg1"/>
+              <a:rPr lang="fr-FR" sz="1100" b="1" smtClean="0">
+                <a:solidFill>
+                  <a:srgbClr val="FFC000"/>
                 </a:solidFill>
               </a:rPr>
-              <a:t>PartNumber</a:t>
+              <a:t>ID (int)</a:t>
             </a:r>
           </a:p>
           <a:p>
@@ -3071,8 +3071,13 @@
                   <a:schemeClr val="bg1"/>
                 </a:solidFill>
               </a:rPr>
-              <a:t>Manufacturer</a:t>
-            </a:r>
+              <a:t>PartNumber (string)</a:t>
+            </a:r>
+            <a:endParaRPr lang="fr-FR" sz="1100" smtClean="0">
+              <a:solidFill>
+                <a:schemeClr val="bg1"/>
+              </a:solidFill>
+            </a:endParaRPr>
           </a:p>
           <a:p>
             <a:pPr marL="171450" indent="-171450">
@@ -3085,8 +3090,13 @@
                   <a:schemeClr val="bg1"/>
                 </a:solidFill>
               </a:rPr>
-              <a:t>Name</a:t>
-            </a:r>
+              <a:t>Manufacturer (string)</a:t>
+            </a:r>
+            <a:endParaRPr lang="fr-FR" sz="1100" smtClean="0">
+              <a:solidFill>
+                <a:schemeClr val="bg1"/>
+              </a:solidFill>
+            </a:endParaRPr>
           </a:p>
           <a:p>
             <a:pPr marL="171450" indent="-171450">
@@ -3099,8 +3109,13 @@
                   <a:schemeClr val="bg1"/>
                 </a:solidFill>
               </a:rPr>
-              <a:t>Type</a:t>
-            </a:r>
+              <a:t>Name (sting)</a:t>
+            </a:r>
+            <a:endParaRPr lang="fr-FR" sz="1100" smtClean="0">
+              <a:solidFill>
+                <a:schemeClr val="bg1"/>
+              </a:solidFill>
+            </a:endParaRPr>
           </a:p>
           <a:p>
             <a:pPr marL="171450" indent="-171450">
@@ -3113,16 +3128,13 @@
                   <a:schemeClr val="bg1"/>
                 </a:solidFill>
               </a:rPr>
-              <a:t>Ata</a:t>
-            </a:r>
-            <a:r>
-              <a:rPr lang="fr-FR" sz="1100" baseline="30000" smtClean="0">
-                <a:solidFill>
-                  <a:schemeClr val="bg1"/>
-                </a:solidFill>
-              </a:rPr>
-              <a:t>(int)</a:t>
-            </a:r>
+              <a:t>Type (string)</a:t>
+            </a:r>
+            <a:endParaRPr lang="fr-FR" sz="1100" smtClean="0">
+              <a:solidFill>
+                <a:schemeClr val="bg1"/>
+              </a:solidFill>
+            </a:endParaRPr>
           </a:p>
           <a:p>
             <a:pPr marL="171450" indent="-171450">
@@ -3135,8 +3147,13 @@
                   <a:schemeClr val="bg1"/>
                 </a:solidFill>
               </a:rPr>
-              <a:t>ActivityField</a:t>
-            </a:r>
+              <a:t>Ata (int)</a:t>
+            </a:r>
+            <a:endParaRPr lang="fr-FR" sz="1100" baseline="30000" smtClean="0">
+              <a:solidFill>
+                <a:schemeClr val="bg1"/>
+              </a:solidFill>
+            </a:endParaRPr>
           </a:p>
           <a:p>
             <a:pPr marL="171450" indent="-171450">
@@ -3149,8 +3166,13 @@
                   <a:schemeClr val="bg1"/>
                 </a:solidFill>
               </a:rPr>
-              <a:t>MechanicsGroup</a:t>
-            </a:r>
+              <a:t>ActivityField (String)</a:t>
+            </a:r>
+            <a:endParaRPr lang="fr-FR" sz="1100" smtClean="0">
+              <a:solidFill>
+                <a:schemeClr val="bg1"/>
+              </a:solidFill>
+            </a:endParaRPr>
           </a:p>
           <a:p>
             <a:pPr marL="171450" indent="-171450">
@@ -3163,8 +3185,13 @@
                   <a:schemeClr val="bg1"/>
                 </a:solidFill>
               </a:rPr>
-              <a:t>DocumentsReference</a:t>
-            </a:r>
+              <a:t>MechanicsGroup (string)</a:t>
+            </a:r>
+            <a:endParaRPr lang="fr-FR" sz="1100" smtClean="0">
+              <a:solidFill>
+                <a:schemeClr val="bg1"/>
+              </a:solidFill>
+            </a:endParaRPr>
           </a:p>
           <a:p>
             <a:pPr marL="171450" indent="-171450">
@@ -3174,6 +3201,25 @@
             <a:r>
               <a:rPr lang="fr-FR" sz="1100" smtClean="0">
                 <a:solidFill>
+                  <a:srgbClr val="FFC000"/>
+                </a:solidFill>
+              </a:rPr>
+              <a:t>MaintenanceDataId (int)</a:t>
+            </a:r>
+            <a:endParaRPr lang="fr-FR" sz="1100" smtClean="0">
+              <a:solidFill>
+                <a:srgbClr val="FFC000"/>
+              </a:solidFill>
+            </a:endParaRPr>
+          </a:p>
+          <a:p>
+            <a:pPr marL="171450" indent="-171450">
+              <a:buFont typeface="Arial" panose="020B0604020202020204" pitchFamily="34" charset="0"/>
+              <a:buChar char="•"/>
+            </a:pPr>
+            <a:r>
+              <a:rPr lang="fr-FR" sz="1100" smtClean="0">
+                <a:solidFill>
                   <a:schemeClr val="bg1"/>
                 </a:solidFill>
                 <a:sym typeface="Wingdings" panose="05000000000000000000" pitchFamily="2" charset="2"/>
@@ -3183,32 +3229,54 @@
           </a:p>
           <a:p>
             <a:pPr marL="171450" indent="-171450">
-              <a:buFont typeface="Wingdings" panose="05000000000000000000" pitchFamily="2" charset="2"/>
-              <a:buChar char=""/>
+              <a:buFont typeface="Arial" panose="020B0604020202020204" pitchFamily="34" charset="0"/>
+              <a:buChar char="•"/>
             </a:pPr>
             <a:r>
               <a:rPr lang="fr-FR" sz="1100" smtClean="0">
                 <a:solidFill>
-                  <a:srgbClr val="FF0000"/>
+                  <a:srgbClr val="00B0F0"/>
                 </a:solidFill>
                 <a:sym typeface="Wingdings" panose="05000000000000000000" pitchFamily="2" charset="2"/>
               </a:rPr>
-              <a:t>EquipmentCenters</a:t>
+              <a:t>EquipmentCentersActionList (c,a;c,a)</a:t>
             </a:r>
           </a:p>
           <a:p>
             <a:pPr marL="171450" indent="-171450">
-              <a:buFont typeface="Wingdings" panose="05000000000000000000" pitchFamily="2" charset="2"/>
-              <a:buChar char="3"/>
+              <a:buFont typeface="Arial" panose="020B0604020202020204" pitchFamily="34" charset="0"/>
+              <a:buChar char="•"/>
             </a:pPr>
             <a:r>
               <a:rPr lang="fr-FR" sz="1100" smtClean="0">
                 <a:solidFill>
-                  <a:srgbClr val="FF0000"/>
-                </a:solidFill>
+                  <a:schemeClr val="bg1"/>
+                </a:solidFill>
+                <a:sym typeface="Wingdings" panose="05000000000000000000" pitchFamily="2" charset="2"/>
               </a:rPr>
-              <a:t>EquipmentMonitoring</a:t>
-            </a:r>
+              <a:t>MonitoringDate (DateTime)</a:t>
+            </a:r>
+          </a:p>
+          <a:p>
+            <a:pPr marL="171450" indent="-171450">
+              <a:buFont typeface="Arial" panose="020B0604020202020204" pitchFamily="34" charset="0"/>
+              <a:buChar char="•"/>
+            </a:pPr>
+            <a:r>
+              <a:rPr lang="fr-FR" sz="1100" smtClean="0">
+                <a:solidFill>
+                  <a:srgbClr val="FFC000"/>
+                </a:solidFill>
+                <a:sym typeface="Wingdings" panose="05000000000000000000" pitchFamily="2" charset="2"/>
+              </a:rPr>
+              <a:t>MonitoringUserId (int)</a:t>
+            </a:r>
+            <a:endParaRPr lang="fr-FR" sz="1100" smtClean="0">
+              <a:solidFill>
+                <a:srgbClr val="FFC000"/>
+              </a:solidFill>
+              <a:sym typeface="Wingdings" panose="05000000000000000000" pitchFamily="2" charset="2"/>
+            </a:endParaRPr>
           </a:p>
         </p:txBody>
       </p:sp>
@@ -3220,8 +3288,8 @@
         </p:nvSpPr>
         <p:spPr>
           <a:xfrm>
-            <a:off x="4044775" y="393824"/>
-            <a:ext cx="1746421" cy="261610"/>
+            <a:off x="165783" y="3098050"/>
+            <a:ext cx="1967295" cy="261610"/>
           </a:xfrm>
           <a:prstGeom prst="rect">
             <a:avLst/>
@@ -3261,8 +3329,8 @@
         </p:nvSpPr>
         <p:spPr>
           <a:xfrm>
-            <a:off x="4044774" y="655434"/>
-            <a:ext cx="1746421" cy="261610"/>
+            <a:off x="165782" y="3359660"/>
+            <a:ext cx="1967296" cy="430887"/>
           </a:xfrm>
           <a:prstGeom prst="rect">
             <a:avLst/>
@@ -3287,13 +3355,32 @@
               <a:buChar char="•"/>
             </a:pPr>
             <a:r>
+              <a:rPr lang="fr-FR" sz="1100" b="1" smtClean="0">
+                <a:solidFill>
+                  <a:srgbClr val="FFC000"/>
+                </a:solidFill>
+              </a:rPr>
+              <a:t>ID (int)</a:t>
+            </a:r>
+          </a:p>
+          <a:p>
+            <a:pPr marL="171450" indent="-171450">
+              <a:buFont typeface="Arial" panose="020B0604020202020204" pitchFamily="34" charset="0"/>
+              <a:buChar char="•"/>
+            </a:pPr>
+            <a:r>
               <a:rPr lang="fr-FR" sz="1100" smtClean="0">
                 <a:solidFill>
                   <a:schemeClr val="bg1"/>
                 </a:solidFill>
               </a:rPr>
-              <a:t>Description</a:t>
-            </a:r>
+              <a:t>Description (string)</a:t>
+            </a:r>
+            <a:endParaRPr lang="fr-FR" sz="1100" smtClean="0">
+              <a:solidFill>
+                <a:schemeClr val="bg1"/>
+              </a:solidFill>
+            </a:endParaRPr>
           </a:p>
         </p:txBody>
       </p:sp>
@@ -3305,8 +3392,8 @@
         </p:nvSpPr>
         <p:spPr>
           <a:xfrm>
-            <a:off x="10280819" y="393824"/>
-            <a:ext cx="1746421" cy="261610"/>
+            <a:off x="165782" y="1974666"/>
+            <a:ext cx="1967296" cy="261610"/>
           </a:xfrm>
           <a:prstGeom prst="rect">
             <a:avLst/>
@@ -3346,8 +3433,8 @@
         </p:nvSpPr>
         <p:spPr>
           <a:xfrm>
-            <a:off x="10280818" y="655434"/>
-            <a:ext cx="1746421" cy="430887"/>
+            <a:off x="165781" y="2236276"/>
+            <a:ext cx="1967297" cy="600164"/>
           </a:xfrm>
           <a:prstGeom prst="rect">
             <a:avLst/>
@@ -3372,40 +3459,59 @@
               <a:buChar char="•"/>
             </a:pPr>
             <a:r>
+              <a:rPr lang="fr-FR" sz="1100" b="1" smtClean="0">
+                <a:solidFill>
+                  <a:srgbClr val="FFC000"/>
+                </a:solidFill>
+              </a:rPr>
+              <a:t>ID (int)</a:t>
+            </a:r>
+          </a:p>
+          <a:p>
+            <a:pPr marL="171450" indent="-171450">
+              <a:buFont typeface="Arial" panose="020B0604020202020204" pitchFamily="34" charset="0"/>
+              <a:buChar char="•"/>
+            </a:pPr>
+            <a:r>
               <a:rPr lang="fr-FR" sz="1100" smtClean="0">
                 <a:solidFill>
                   <a:schemeClr val="bg1"/>
                 </a:solidFill>
               </a:rPr>
-              <a:t>Name</a:t>
+              <a:t>Name (string)</a:t>
             </a:r>
           </a:p>
           <a:p>
             <a:pPr marL="171450" indent="-171450">
-              <a:buFont typeface="Wingdings" panose="05000000000000000000" pitchFamily="2" charset="2"/>
-              <a:buChar char="4"/>
+              <a:buFont typeface="Arial" panose="020B0604020202020204" pitchFamily="34" charset="0"/>
+              <a:buChar char="•"/>
             </a:pPr>
             <a:r>
               <a:rPr lang="fr-FR" sz="1100" smtClean="0">
                 <a:solidFill>
-                  <a:srgbClr val="FF0000"/>
+                  <a:srgbClr val="00B0F0"/>
                 </a:solidFill>
               </a:rPr>
-              <a:t>Users</a:t>
-            </a:r>
-          </a:p>
-        </p:txBody>
-      </p:sp>
-      <p:sp>
-        <p:nvSpPr>
-          <p:cNvPr id="13" name="TextBox 12"/>
+              <a:t>UserList (u;u)</a:t>
+            </a:r>
+            <a:endParaRPr lang="fr-FR" sz="1100" smtClean="0">
+              <a:solidFill>
+                <a:srgbClr val="00B0F0"/>
+              </a:solidFill>
+            </a:endParaRPr>
+          </a:p>
+        </p:txBody>
+      </p:sp>
+      <p:sp>
+        <p:nvSpPr>
+          <p:cNvPr id="15" name="TextBox 14"/>
           <p:cNvSpPr txBox="1"/>
           <p:nvPr/>
         </p:nvSpPr>
         <p:spPr>
           <a:xfrm>
-            <a:off x="8204884" y="1680135"/>
-            <a:ext cx="1746421" cy="261610"/>
+            <a:off x="3366698" y="3918123"/>
+            <a:ext cx="1967297" cy="261610"/>
           </a:xfrm>
           <a:prstGeom prst="rect">
             <a:avLst/>
@@ -3432,21 +3538,21 @@
             <a:pPr algn="ctr"/>
             <a:r>
               <a:rPr lang="fr-FR" sz="1100" smtClean="0"/>
-              <a:t>EquipmentMonitoring</a:t>
-            </a:r>
-          </a:p>
-        </p:txBody>
-      </p:sp>
-      <p:sp>
-        <p:nvSpPr>
-          <p:cNvPr id="14" name="TextBox 13"/>
+              <a:t>User</a:t>
+            </a:r>
+          </a:p>
+        </p:txBody>
+      </p:sp>
+      <p:sp>
+        <p:nvSpPr>
+          <p:cNvPr id="16" name="TextBox 15"/>
           <p:cNvSpPr txBox="1"/>
           <p:nvPr/>
         </p:nvSpPr>
         <p:spPr>
           <a:xfrm>
-            <a:off x="8204883" y="1941745"/>
-            <a:ext cx="1746421" cy="430887"/>
+            <a:off x="3366697" y="4179733"/>
+            <a:ext cx="1967298" cy="1277273"/>
           </a:xfrm>
           <a:prstGeom prst="rect">
             <a:avLst/>
@@ -3471,40 +3577,125 @@
               <a:buChar char="•"/>
             </a:pPr>
             <a:r>
+              <a:rPr lang="fr-FR" sz="1100" b="1" smtClean="0">
+                <a:solidFill>
+                  <a:srgbClr val="FFC000"/>
+                </a:solidFill>
+              </a:rPr>
+              <a:t>Id (int)</a:t>
+            </a:r>
+          </a:p>
+          <a:p>
+            <a:pPr marL="171450" indent="-171450">
+              <a:buFont typeface="Arial" panose="020B0604020202020204" pitchFamily="34" charset="0"/>
+              <a:buChar char="•"/>
+            </a:pPr>
+            <a:r>
               <a:rPr lang="fr-FR" sz="1100" smtClean="0">
                 <a:solidFill>
                   <a:schemeClr val="bg1"/>
                 </a:solidFill>
               </a:rPr>
-              <a:t>Date</a:t>
+              <a:t>FirstName (string)</a:t>
             </a:r>
           </a:p>
           <a:p>
             <a:pPr marL="171450" indent="-171450">
-              <a:buFont typeface="Wingdings" panose="05000000000000000000" pitchFamily="2" charset="2"/>
-              <a:buChar char="3"/>
+              <a:buFont typeface="Arial" panose="020B0604020202020204" pitchFamily="34" charset="0"/>
+              <a:buChar char="•"/>
             </a:pPr>
             <a:r>
               <a:rPr lang="fr-FR" sz="1100" smtClean="0">
                 <a:solidFill>
-                  <a:srgbClr val="FF0000"/>
+                  <a:schemeClr val="bg1"/>
                 </a:solidFill>
               </a:rPr>
-              <a:t>User</a:t>
-            </a:r>
-          </a:p>
-        </p:txBody>
-      </p:sp>
-      <p:sp>
-        <p:nvSpPr>
-          <p:cNvPr id="15" name="TextBox 14"/>
+              <a:t>LastName (string)</a:t>
+            </a:r>
+            <a:endParaRPr lang="fr-FR" sz="1100" smtClean="0">
+              <a:solidFill>
+                <a:schemeClr val="bg1"/>
+              </a:solidFill>
+            </a:endParaRPr>
+          </a:p>
+          <a:p>
+            <a:pPr marL="171450" indent="-171450">
+              <a:buFont typeface="Arial" panose="020B0604020202020204" pitchFamily="34" charset="0"/>
+              <a:buChar char="•"/>
+            </a:pPr>
+            <a:r>
+              <a:rPr lang="fr-FR" sz="1100" smtClean="0">
+                <a:solidFill>
+                  <a:schemeClr val="bg1"/>
+                </a:solidFill>
+              </a:rPr>
+              <a:t>UserName (string)</a:t>
+            </a:r>
+            <a:endParaRPr lang="fr-FR" sz="1100" smtClean="0">
+              <a:solidFill>
+                <a:schemeClr val="bg1"/>
+              </a:solidFill>
+            </a:endParaRPr>
+          </a:p>
+          <a:p>
+            <a:pPr marL="171450" indent="-171450">
+              <a:buFont typeface="Arial" panose="020B0604020202020204" pitchFamily="34" charset="0"/>
+              <a:buChar char="•"/>
+            </a:pPr>
+            <a:r>
+              <a:rPr lang="fr-FR" sz="1100" smtClean="0">
+                <a:solidFill>
+                  <a:schemeClr val="bg1"/>
+                </a:solidFill>
+              </a:rPr>
+              <a:t>Password (string)</a:t>
+            </a:r>
+          </a:p>
+          <a:p>
+            <a:pPr marL="171450" indent="-171450">
+              <a:buFont typeface="Arial" panose="020B0604020202020204" pitchFamily="34" charset="0"/>
+              <a:buChar char="•"/>
+            </a:pPr>
+            <a:r>
+              <a:rPr lang="fr-FR" sz="1100" smtClean="0">
+                <a:solidFill>
+                  <a:schemeClr val="bg1"/>
+                </a:solidFill>
+              </a:rPr>
+              <a:t>IsAdministrator (bool)</a:t>
+            </a:r>
+          </a:p>
+          <a:p>
+            <a:pPr marL="171450" indent="-171450">
+              <a:buFont typeface="Arial" panose="020B0604020202020204" pitchFamily="34" charset="0"/>
+              <a:buChar char="•"/>
+            </a:pPr>
+            <a:r>
+              <a:rPr lang="fr-FR" sz="1100" smtClean="0">
+                <a:solidFill>
+                  <a:schemeClr val="bg1"/>
+                </a:solidFill>
+              </a:rPr>
+              <a:t>IsActive (bool)</a:t>
+            </a:r>
+            <a:endParaRPr lang="fr-FR" sz="1100" smtClean="0">
+              <a:solidFill>
+                <a:schemeClr val="bg1"/>
+              </a:solidFill>
+            </a:endParaRPr>
+          </a:p>
+        </p:txBody>
+      </p:sp>
+      <p:sp>
+        <p:nvSpPr>
+          <p:cNvPr id="27" name="TextBox 26"/>
           <p:cNvSpPr txBox="1"/>
           <p:nvPr/>
         </p:nvSpPr>
         <p:spPr>
           <a:xfrm>
-            <a:off x="8204885" y="393824"/>
-            <a:ext cx="1746421" cy="261610"/>
+            <a:off x="6567615" y="174173"/>
+            <a:ext cx="1967295" cy="261610"/>
           </a:xfrm>
           <a:prstGeom prst="rect">
             <a:avLst/>
@@ -3531,21 +3722,22 @@
             <a:pPr algn="ctr"/>
             <a:r>
               <a:rPr lang="fr-FR" sz="1100" smtClean="0"/>
-              <a:t>User</a:t>
-            </a:r>
-          </a:p>
-        </p:txBody>
-      </p:sp>
-      <p:sp>
-        <p:nvSpPr>
-          <p:cNvPr id="16" name="TextBox 15"/>
+              <a:t>MaintenanceData</a:t>
+            </a:r>
+            <a:endParaRPr lang="fr-FR" sz="1100" smtClean="0"/>
+          </a:p>
+        </p:txBody>
+      </p:sp>
+      <p:sp>
+        <p:nvSpPr>
+          <p:cNvPr id="29" name="TextBox 28"/>
           <p:cNvSpPr txBox="1"/>
           <p:nvPr/>
         </p:nvSpPr>
         <p:spPr>
           <a:xfrm>
-            <a:off x="8204884" y="655434"/>
-            <a:ext cx="1746421" cy="769441"/>
+            <a:off x="6567614" y="435783"/>
+            <a:ext cx="1967296" cy="2292935"/>
           </a:xfrm>
           <a:prstGeom prst="rect">
             <a:avLst/>
@@ -3570,12 +3762,12 @@
               <a:buChar char="•"/>
             </a:pPr>
             <a:r>
-              <a:rPr lang="fr-FR" sz="1100" smtClean="0">
-                <a:solidFill>
-                  <a:schemeClr val="bg1"/>
+              <a:rPr lang="fr-FR" sz="1100" b="1" smtClean="0">
+                <a:solidFill>
+                  <a:srgbClr val="FFC000"/>
                 </a:solidFill>
               </a:rPr>
-              <a:t>FamilyName</a:t>
+              <a:t>ID (int)</a:t>
             </a:r>
           </a:p>
           <a:p>
@@ -3589,7 +3781,7 @@
                   <a:schemeClr val="bg1"/>
                 </a:solidFill>
               </a:rPr>
-              <a:t>FirstName</a:t>
+              <a:t>Type (string)</a:t>
             </a:r>
           </a:p>
           <a:p>
@@ -3603,8 +3795,13 @@
                   <a:schemeClr val="bg1"/>
                 </a:solidFill>
               </a:rPr>
-              <a:t>UserName</a:t>
-            </a:r>
+              <a:t>Sender (string)</a:t>
+            </a:r>
+            <a:endParaRPr lang="fr-FR" sz="1100" smtClean="0">
+              <a:solidFill>
+                <a:schemeClr val="bg1"/>
+              </a:solidFill>
+            </a:endParaRPr>
           </a:p>
           <a:p>
             <a:pPr marL="171450" indent="-171450">
@@ -3617,125 +3814,210 @@
                   <a:schemeClr val="bg1"/>
                 </a:solidFill>
               </a:rPr>
-              <a:t>Password</a:t>
-            </a:r>
-          </a:p>
-        </p:txBody>
-      </p:sp>
-      <p:sp>
-        <p:nvSpPr>
-          <p:cNvPr id="20" name="TextBox 19"/>
-          <p:cNvSpPr txBox="1"/>
-          <p:nvPr/>
-        </p:nvSpPr>
-        <p:spPr>
-          <a:xfrm>
-            <a:off x="6120710" y="393824"/>
-            <a:ext cx="1746421" cy="261610"/>
-          </a:xfrm>
-          <a:prstGeom prst="rect">
-            <a:avLst/>
-          </a:prstGeom>
-          <a:solidFill>
-            <a:schemeClr val="bg1">
-              <a:lumMod val="95000"/>
-            </a:schemeClr>
-          </a:solidFill>
-          <a:ln>
-            <a:solidFill>
-              <a:schemeClr val="bg1">
-                <a:lumMod val="50000"/>
-              </a:schemeClr>
-            </a:solidFill>
-          </a:ln>
-        </p:spPr>
-        <p:txBody>
-          <a:bodyPr wrap="square" rtlCol="0">
-            <a:spAutoFit/>
-          </a:bodyPr>
-          <a:lstStyle/>
-          <a:p>
-            <a:pPr algn="ctr"/>
-            <a:r>
-              <a:rPr lang="fr-FR" sz="1100" smtClean="0"/>
-              <a:t>EquipmentCenter</a:t>
-            </a:r>
-          </a:p>
-        </p:txBody>
-      </p:sp>
-      <p:sp>
-        <p:nvSpPr>
-          <p:cNvPr id="21" name="TextBox 20"/>
-          <p:cNvSpPr txBox="1"/>
-          <p:nvPr/>
-        </p:nvSpPr>
-        <p:spPr>
-          <a:xfrm>
-            <a:off x="6120709" y="655434"/>
-            <a:ext cx="1746421" cy="430887"/>
-          </a:xfrm>
-          <a:prstGeom prst="rect">
-            <a:avLst/>
-          </a:prstGeom>
-          <a:noFill/>
-          <a:ln>
-            <a:solidFill>
-              <a:schemeClr val="bg1">
-                <a:lumMod val="50000"/>
-              </a:schemeClr>
-            </a:solidFill>
-          </a:ln>
-        </p:spPr>
-        <p:txBody>
-          <a:bodyPr wrap="square" rtlCol="0">
-            <a:spAutoFit/>
-          </a:bodyPr>
-          <a:lstStyle/>
+              <a:t>DocumentReference</a:t>
+            </a:r>
+            <a:r>
+              <a:rPr lang="fr-FR" sz="1100" smtClean="0">
+                <a:solidFill>
+                  <a:schemeClr val="bg1"/>
+                </a:solidFill>
+              </a:rPr>
+              <a:t> (sting)</a:t>
+            </a:r>
+            <a:endParaRPr lang="fr-FR" sz="1100" smtClean="0">
+              <a:solidFill>
+                <a:schemeClr val="bg1"/>
+              </a:solidFill>
+            </a:endParaRPr>
+          </a:p>
           <a:p>
             <a:pPr marL="171450" indent="-171450">
-              <a:buFont typeface="Wingdings" panose="05000000000000000000" pitchFamily="2" charset="2"/>
-              <a:buChar char="3"/>
+              <a:buFont typeface="Arial" panose="020B0604020202020204" pitchFamily="34" charset="0"/>
+              <a:buChar char="•"/>
             </a:pPr>
             <a:r>
               <a:rPr lang="fr-FR" sz="1100" smtClean="0">
                 <a:solidFill>
-                  <a:srgbClr val="FF0000"/>
+                  <a:schemeClr val="bg1"/>
                 </a:solidFill>
               </a:rPr>
-              <a:t>Center</a:t>
-            </a:r>
+              <a:t>DocumentPartNumber</a:t>
+            </a:r>
+            <a:r>
+              <a:rPr lang="fr-FR" sz="1100" smtClean="0">
+                <a:solidFill>
+                  <a:schemeClr val="bg1"/>
+                </a:solidFill>
+              </a:rPr>
+              <a:t> (string)</a:t>
+            </a:r>
+            <a:endParaRPr lang="fr-FR" sz="1100" smtClean="0">
+              <a:solidFill>
+                <a:schemeClr val="bg1"/>
+              </a:solidFill>
+            </a:endParaRPr>
           </a:p>
           <a:p>
             <a:pPr marL="171450" indent="-171450">
-              <a:buFont typeface="Wingdings" panose="05000000000000000000" pitchFamily="2" charset="2"/>
-              <a:buChar char="4"/>
+              <a:buFont typeface="Arial" panose="020B0604020202020204" pitchFamily="34" charset="0"/>
+              <a:buChar char="•"/>
             </a:pPr>
             <a:r>
               <a:rPr lang="fr-FR" sz="1100" smtClean="0">
                 <a:solidFill>
-                  <a:srgbClr val="FF0000"/>
+                  <a:schemeClr val="bg1"/>
                 </a:solidFill>
               </a:rPr>
-              <a:t>Actions</a:t>
-            </a:r>
+              <a:t>Review (string)</a:t>
+            </a:r>
+            <a:endParaRPr lang="fr-FR" sz="1100" baseline="30000" smtClean="0">
+              <a:solidFill>
+                <a:schemeClr val="bg1"/>
+              </a:solidFill>
+            </a:endParaRPr>
+          </a:p>
+          <a:p>
+            <a:pPr marL="171450" indent="-171450">
+              <a:buFont typeface="Arial" panose="020B0604020202020204" pitchFamily="34" charset="0"/>
+              <a:buChar char="•"/>
+            </a:pPr>
+            <a:r>
+              <a:rPr lang="fr-FR" sz="1100" smtClean="0">
+                <a:solidFill>
+                  <a:schemeClr val="bg1"/>
+                </a:solidFill>
+              </a:rPr>
+              <a:t>Date</a:t>
+            </a:r>
+            <a:r>
+              <a:rPr lang="fr-FR" sz="1100" smtClean="0">
+                <a:solidFill>
+                  <a:schemeClr val="bg1"/>
+                </a:solidFill>
+              </a:rPr>
+              <a:t> (DateTime)</a:t>
+            </a:r>
+            <a:endParaRPr lang="fr-FR" sz="1100" smtClean="0">
+              <a:solidFill>
+                <a:schemeClr val="bg1"/>
+              </a:solidFill>
+            </a:endParaRPr>
+          </a:p>
+          <a:p>
+            <a:pPr marL="171450" indent="-171450">
+              <a:buFont typeface="Arial" panose="020B0604020202020204" pitchFamily="34" charset="0"/>
+              <a:buChar char="•"/>
+            </a:pPr>
+            <a:r>
+              <a:rPr lang="fr-FR" sz="1100" smtClean="0">
+                <a:solidFill>
+                  <a:schemeClr val="bg1"/>
+                </a:solidFill>
+              </a:rPr>
+              <a:t>Name</a:t>
+            </a:r>
+            <a:r>
+              <a:rPr lang="fr-FR" sz="1100" smtClean="0">
+                <a:solidFill>
+                  <a:schemeClr val="bg1"/>
+                </a:solidFill>
+              </a:rPr>
+              <a:t> (string)</a:t>
+            </a:r>
+            <a:endParaRPr lang="fr-FR" sz="1100" smtClean="0">
+              <a:solidFill>
+                <a:schemeClr val="bg1"/>
+              </a:solidFill>
+            </a:endParaRPr>
+          </a:p>
+          <a:p>
+            <a:pPr marL="171450" indent="-171450">
+              <a:buFont typeface="Arial" panose="020B0604020202020204" pitchFamily="34" charset="0"/>
+              <a:buChar char="•"/>
+            </a:pPr>
+            <a:r>
+              <a:rPr lang="fr-FR" sz="1100" smtClean="0">
+                <a:solidFill>
+                  <a:schemeClr val="bg1"/>
+                </a:solidFill>
+                <a:sym typeface="Wingdings" panose="05000000000000000000" pitchFamily="2" charset="2"/>
+              </a:rPr>
+              <a:t>OnCertificate (bool)</a:t>
+            </a:r>
+          </a:p>
+          <a:p>
+            <a:pPr marL="171450" indent="-171450">
+              <a:buFont typeface="Arial" panose="020B0604020202020204" pitchFamily="34" charset="0"/>
+              <a:buChar char="•"/>
+            </a:pPr>
+            <a:r>
+              <a:rPr lang="fr-FR" sz="1100" smtClean="0">
+                <a:solidFill>
+                  <a:schemeClr val="bg1"/>
+                </a:solidFill>
+                <a:sym typeface="Wingdings" panose="05000000000000000000" pitchFamily="2" charset="2"/>
+              </a:rPr>
+              <a:t>Document (Byte[])</a:t>
+            </a:r>
+            <a:endParaRPr lang="fr-FR" sz="1100" smtClean="0">
+              <a:solidFill>
+                <a:schemeClr val="bg1"/>
+              </a:solidFill>
+              <a:sym typeface="Wingdings" panose="05000000000000000000" pitchFamily="2" charset="2"/>
+            </a:endParaRPr>
+          </a:p>
+          <a:p>
+            <a:pPr marL="171450" indent="-171450">
+              <a:buFont typeface="Arial" panose="020B0604020202020204" pitchFamily="34" charset="0"/>
+              <a:buChar char="•"/>
+            </a:pPr>
+            <a:r>
+              <a:rPr lang="fr-FR" sz="1100" smtClean="0">
+                <a:solidFill>
+                  <a:schemeClr val="bg1"/>
+                </a:solidFill>
+                <a:sym typeface="Wingdings" panose="05000000000000000000" pitchFamily="2" charset="2"/>
+              </a:rPr>
+              <a:t>MonitoringDate (DateTime)</a:t>
+            </a:r>
+          </a:p>
+          <a:p>
+            <a:pPr marL="171450" indent="-171450">
+              <a:buFont typeface="Arial" panose="020B0604020202020204" pitchFamily="34" charset="0"/>
+              <a:buChar char="•"/>
+            </a:pPr>
+            <a:r>
+              <a:rPr lang="fr-FR" sz="1100" smtClean="0">
+                <a:solidFill>
+                  <a:srgbClr val="FFC000"/>
+                </a:solidFill>
+                <a:sym typeface="Wingdings" panose="05000000000000000000" pitchFamily="2" charset="2"/>
+              </a:rPr>
+              <a:t>MonitoringUserId (int)</a:t>
+            </a:r>
+            <a:endParaRPr lang="fr-FR" sz="1100" smtClean="0">
+              <a:solidFill>
+                <a:srgbClr val="FFC000"/>
+              </a:solidFill>
+              <a:sym typeface="Wingdings" panose="05000000000000000000" pitchFamily="2" charset="2"/>
+            </a:endParaRPr>
           </a:p>
         </p:txBody>
       </p:sp>
       <p:cxnSp>
         <p:nvCxnSpPr>
-          <p:cNvPr id="24" name="Straight Arrow Connector 23"/>
+          <p:cNvPr id="38" name="Elbow Connector 37"/>
           <p:cNvCxnSpPr>
-            <a:stCxn id="15" idx="3"/>
-            <a:endCxn id="9" idx="1"/>
+            <a:stCxn id="9" idx="3"/>
           </p:cNvCxnSpPr>
           <p:nvPr/>
         </p:nvCxnSpPr>
         <p:spPr>
           <a:xfrm>
-            <a:off x="9951306" y="524629"/>
-            <a:ext cx="329513" cy="0"/>
+            <a:off x="2133078" y="2105471"/>
+            <a:ext cx="1233619" cy="273769"/>
           </a:xfrm>
-          <a:prstGeom prst="straightConnector1">
+          <a:prstGeom prst="bentConnector3">
             <a:avLst/>
           </a:prstGeom>
           <a:ln>
@@ -3759,163 +4041,16 @@
       </p:cxnSp>
       <p:cxnSp>
         <p:nvCxnSpPr>
-          <p:cNvPr id="26" name="Straight Arrow Connector 25"/>
+          <p:cNvPr id="41" name="Elbow Connector 40"/>
           <p:cNvCxnSpPr>
             <a:stCxn id="7" idx="3"/>
-            <a:endCxn id="20" idx="1"/>
           </p:cNvCxnSpPr>
           <p:nvPr/>
         </p:nvCxnSpPr>
         <p:spPr>
-          <a:xfrm>
-            <a:off x="5791196" y="524629"/>
-            <a:ext cx="329514" cy="0"/>
-          </a:xfrm>
-          <a:prstGeom prst="straightConnector1">
-            <a:avLst/>
-          </a:prstGeom>
-          <a:ln>
-            <a:tailEnd type="triangle"/>
-          </a:ln>
-        </p:spPr>
-        <p:style>
-          <a:lnRef idx="1">
-            <a:schemeClr val="accent1"/>
-          </a:lnRef>
-          <a:fillRef idx="0">
-            <a:schemeClr val="accent1"/>
-          </a:fillRef>
-          <a:effectRef idx="0">
-            <a:schemeClr val="accent1"/>
-          </a:effectRef>
-          <a:fontRef idx="minor">
-            <a:schemeClr val="tx1"/>
-          </a:fontRef>
-        </p:style>
-      </p:cxnSp>
-      <p:cxnSp>
-        <p:nvCxnSpPr>
-          <p:cNvPr id="28" name="Elbow Connector 27"/>
-          <p:cNvCxnSpPr>
-            <a:stCxn id="9" idx="0"/>
-            <a:endCxn id="20" idx="0"/>
-          </p:cNvCxnSpPr>
-          <p:nvPr/>
-        </p:nvCxnSpPr>
-        <p:spPr>
-          <a:xfrm rot="16200000" flipV="1">
-            <a:off x="9073976" y="-1686231"/>
-            <a:ext cx="12700" cy="4160109"/>
-          </a:xfrm>
-          <a:prstGeom prst="bentConnector3">
-            <a:avLst>
-              <a:gd name="adj1" fmla="val 1800000"/>
-            </a:avLst>
-          </a:prstGeom>
-          <a:ln>
-            <a:tailEnd type="triangle"/>
-          </a:ln>
-        </p:spPr>
-        <p:style>
-          <a:lnRef idx="1">
-            <a:schemeClr val="accent1"/>
-          </a:lnRef>
-          <a:fillRef idx="0">
-            <a:schemeClr val="accent1"/>
-          </a:fillRef>
-          <a:effectRef idx="0">
-            <a:schemeClr val="accent1"/>
-          </a:effectRef>
-          <a:fontRef idx="minor">
-            <a:schemeClr val="tx1"/>
-          </a:fontRef>
-        </p:style>
-      </p:cxnSp>
-      <p:cxnSp>
-        <p:nvCxnSpPr>
-          <p:cNvPr id="30" name="Straight Arrow Connector 29"/>
-          <p:cNvCxnSpPr>
-            <a:stCxn id="21" idx="2"/>
-            <a:endCxn id="4" idx="0"/>
-          </p:cNvCxnSpPr>
-          <p:nvPr/>
-        </p:nvCxnSpPr>
-        <p:spPr>
-          <a:xfrm>
-            <a:off x="6993920" y="1086321"/>
-            <a:ext cx="8241" cy="255260"/>
-          </a:xfrm>
-          <a:prstGeom prst="straightConnector1">
-            <a:avLst/>
-          </a:prstGeom>
-          <a:ln>
-            <a:tailEnd type="triangle"/>
-          </a:ln>
-        </p:spPr>
-        <p:style>
-          <a:lnRef idx="1">
-            <a:schemeClr val="accent1"/>
-          </a:lnRef>
-          <a:fillRef idx="0">
-            <a:schemeClr val="accent1"/>
-          </a:fillRef>
-          <a:effectRef idx="0">
-            <a:schemeClr val="accent1"/>
-          </a:effectRef>
-          <a:fontRef idx="minor">
-            <a:schemeClr val="tx1"/>
-          </a:fontRef>
-        </p:style>
-      </p:cxnSp>
-      <p:cxnSp>
-        <p:nvCxnSpPr>
-          <p:cNvPr id="32" name="Elbow Connector 31"/>
-          <p:cNvCxnSpPr>
-            <a:stCxn id="10" idx="2"/>
-            <a:endCxn id="13" idx="3"/>
-          </p:cNvCxnSpPr>
-          <p:nvPr/>
-        </p:nvCxnSpPr>
-        <p:spPr>
-          <a:xfrm rot="5400000">
-            <a:off x="10190358" y="847268"/>
-            <a:ext cx="724619" cy="1202724"/>
-          </a:xfrm>
-          <a:prstGeom prst="bentConnector2">
-            <a:avLst/>
-          </a:prstGeom>
-          <a:ln>
-            <a:tailEnd type="triangle"/>
-          </a:ln>
-        </p:spPr>
-        <p:style>
-          <a:lnRef idx="1">
-            <a:schemeClr val="accent1"/>
-          </a:lnRef>
-          <a:fillRef idx="0">
-            <a:schemeClr val="accent1"/>
-          </a:fillRef>
-          <a:effectRef idx="0">
-            <a:schemeClr val="accent1"/>
-          </a:effectRef>
-          <a:fontRef idx="minor">
-            <a:schemeClr val="tx1"/>
-          </a:fontRef>
-        </p:style>
-      </p:cxnSp>
-      <p:cxnSp>
-        <p:nvCxnSpPr>
-          <p:cNvPr id="34" name="Elbow Connector 33"/>
-          <p:cNvCxnSpPr>
-            <a:stCxn id="13" idx="1"/>
-            <a:endCxn id="4" idx="3"/>
-          </p:cNvCxnSpPr>
-          <p:nvPr/>
-        </p:nvCxnSpPr>
-        <p:spPr>
-          <a:xfrm rot="10800000">
-            <a:off x="7875372" y="1472386"/>
-            <a:ext cx="329513" cy="338554"/>
+          <a:xfrm flipV="1">
+            <a:off x="2133078" y="2379240"/>
+            <a:ext cx="1233619" cy="849615"/>
           </a:xfrm>
           <a:prstGeom prst="bentConnector3">
             <a:avLst/>

</xml_diff>

<commit_message>
Changed: Client side validation to server side.
</commit_message>
<xml_diff>
--- a/Database.pptx
+++ b/Database.pptx
@@ -3073,11 +3073,6 @@
               </a:rPr>
               <a:t>PartNumber (string)</a:t>
             </a:r>
-            <a:endParaRPr lang="fr-FR" sz="1100" smtClean="0">
-              <a:solidFill>
-                <a:schemeClr val="bg1"/>
-              </a:solidFill>
-            </a:endParaRPr>
           </a:p>
           <a:p>
             <a:pPr marL="171450" indent="-171450">
@@ -3092,11 +3087,6 @@
               </a:rPr>
               <a:t>Manufacturer (string)</a:t>
             </a:r>
-            <a:endParaRPr lang="fr-FR" sz="1100" smtClean="0">
-              <a:solidFill>
-                <a:schemeClr val="bg1"/>
-              </a:solidFill>
-            </a:endParaRPr>
           </a:p>
           <a:p>
             <a:pPr marL="171450" indent="-171450">
@@ -3111,11 +3101,6 @@
               </a:rPr>
               <a:t>Name (sting)</a:t>
             </a:r>
-            <a:endParaRPr lang="fr-FR" sz="1100" smtClean="0">
-              <a:solidFill>
-                <a:schemeClr val="bg1"/>
-              </a:solidFill>
-            </a:endParaRPr>
           </a:p>
           <a:p>
             <a:pPr marL="171450" indent="-171450">
@@ -3130,11 +3115,6 @@
               </a:rPr>
               <a:t>Type (string)</a:t>
             </a:r>
-            <a:endParaRPr lang="fr-FR" sz="1100" smtClean="0">
-              <a:solidFill>
-                <a:schemeClr val="bg1"/>
-              </a:solidFill>
-            </a:endParaRPr>
           </a:p>
           <a:p>
             <a:pPr marL="171450" indent="-171450">
@@ -3168,11 +3148,6 @@
               </a:rPr>
               <a:t>ActivityField (String)</a:t>
             </a:r>
-            <a:endParaRPr lang="fr-FR" sz="1100" smtClean="0">
-              <a:solidFill>
-                <a:schemeClr val="bg1"/>
-              </a:solidFill>
-            </a:endParaRPr>
           </a:p>
           <a:p>
             <a:pPr marL="171450" indent="-171450">
@@ -3187,11 +3162,6 @@
               </a:rPr>
               <a:t>MechanicsGroup (string)</a:t>
             </a:r>
-            <a:endParaRPr lang="fr-FR" sz="1100" smtClean="0">
-              <a:solidFill>
-                <a:schemeClr val="bg1"/>
-              </a:solidFill>
-            </a:endParaRPr>
           </a:p>
           <a:p>
             <a:pPr marL="171450" indent="-171450">
@@ -3204,7 +3174,15 @@
                   <a:srgbClr val="FFC000"/>
                 </a:solidFill>
               </a:rPr>
-              <a:t>MaintenanceDataId (int)</a:t>
+              <a:t>MaintenanceDataId (int</a:t>
+            </a:r>
+            <a:r>
+              <a:rPr lang="fr-FR" sz="1100" smtClean="0">
+                <a:solidFill>
+                  <a:srgbClr val="FFC000"/>
+                </a:solidFill>
+              </a:rPr>
+              <a:t>)</a:t>
             </a:r>
             <a:endParaRPr lang="fr-FR" sz="1100" smtClean="0">
               <a:solidFill>
@@ -3271,12 +3249,6 @@
               </a:rPr>
               <a:t>MonitoringUserId (int)</a:t>
             </a:r>
-            <a:endParaRPr lang="fr-FR" sz="1100" smtClean="0">
-              <a:solidFill>
-                <a:srgbClr val="FFC000"/>
-              </a:solidFill>
-              <a:sym typeface="Wingdings" panose="05000000000000000000" pitchFamily="2" charset="2"/>
-            </a:endParaRPr>
           </a:p>
         </p:txBody>
       </p:sp>
@@ -3376,11 +3348,6 @@
               </a:rPr>
               <a:t>Description (string)</a:t>
             </a:r>
-            <a:endParaRPr lang="fr-FR" sz="1100" smtClean="0">
-              <a:solidFill>
-                <a:schemeClr val="bg1"/>
-              </a:solidFill>
-            </a:endParaRPr>
           </a:p>
         </p:txBody>
       </p:sp>
@@ -3494,11 +3461,6 @@
               </a:rPr>
               <a:t>UserList (u;u)</a:t>
             </a:r>
-            <a:endParaRPr lang="fr-FR" sz="1100" smtClean="0">
-              <a:solidFill>
-                <a:srgbClr val="00B0F0"/>
-              </a:solidFill>
-            </a:endParaRPr>
           </a:p>
         </p:txBody>
       </p:sp>
@@ -3582,7 +3544,15 @@
                   <a:srgbClr val="FFC000"/>
                 </a:solidFill>
               </a:rPr>
-              <a:t>Id (int)</a:t>
+              <a:t>ID </a:t>
+            </a:r>
+            <a:r>
+              <a:rPr lang="fr-FR" sz="1100" b="1" smtClean="0">
+                <a:solidFill>
+                  <a:srgbClr val="FFC000"/>
+                </a:solidFill>
+              </a:rPr>
+              <a:t>(int)</a:t>
             </a:r>
           </a:p>
           <a:p>
@@ -3612,11 +3582,6 @@
               </a:rPr>
               <a:t>LastName (string)</a:t>
             </a:r>
-            <a:endParaRPr lang="fr-FR" sz="1100" smtClean="0">
-              <a:solidFill>
-                <a:schemeClr val="bg1"/>
-              </a:solidFill>
-            </a:endParaRPr>
           </a:p>
           <a:p>
             <a:pPr marL="171450" indent="-171450">
@@ -3631,11 +3596,6 @@
               </a:rPr>
               <a:t>UserName (string)</a:t>
             </a:r>
-            <a:endParaRPr lang="fr-FR" sz="1100" smtClean="0">
-              <a:solidFill>
-                <a:schemeClr val="bg1"/>
-              </a:solidFill>
-            </a:endParaRPr>
           </a:p>
           <a:p>
             <a:pPr marL="171450" indent="-171450">
@@ -3678,11 +3638,6 @@
               </a:rPr>
               <a:t>IsActive (bool)</a:t>
             </a:r>
-            <a:endParaRPr lang="fr-FR" sz="1100" smtClean="0">
-              <a:solidFill>
-                <a:schemeClr val="bg1"/>
-              </a:solidFill>
-            </a:endParaRPr>
           </a:p>
         </p:txBody>
       </p:sp>
@@ -3694,7 +3649,7 @@
         </p:nvSpPr>
         <p:spPr>
           <a:xfrm>
-            <a:off x="6567615" y="174173"/>
+            <a:off x="6567617" y="1428362"/>
             <a:ext cx="1967295" cy="261610"/>
           </a:xfrm>
           <a:prstGeom prst="rect">
@@ -3724,7 +3679,6 @@
               <a:rPr lang="fr-FR" sz="1100" smtClean="0"/>
               <a:t>MaintenanceData</a:t>
             </a:r>
-            <a:endParaRPr lang="fr-FR" sz="1100" smtClean="0"/>
           </a:p>
         </p:txBody>
       </p:sp>
@@ -3736,7 +3690,7 @@
         </p:nvSpPr>
         <p:spPr>
           <a:xfrm>
-            <a:off x="6567614" y="435783"/>
+            <a:off x="6567616" y="1689972"/>
             <a:ext cx="1967296" cy="2292935"/>
           </a:xfrm>
           <a:prstGeom prst="rect">
@@ -3797,11 +3751,6 @@
               </a:rPr>
               <a:t>Sender (string)</a:t>
             </a:r>
-            <a:endParaRPr lang="fr-FR" sz="1100" smtClean="0">
-              <a:solidFill>
-                <a:schemeClr val="bg1"/>
-              </a:solidFill>
-            </a:endParaRPr>
           </a:p>
           <a:p>
             <a:pPr marL="171450" indent="-171450">
@@ -3814,48 +3763,22 @@
                   <a:schemeClr val="bg1"/>
                 </a:solidFill>
               </a:rPr>
-              <a:t>DocumentReference</a:t>
-            </a:r>
+              <a:t>DocumentReference (sting)</a:t>
+            </a:r>
+          </a:p>
+          <a:p>
+            <a:pPr marL="171450" indent="-171450">
+              <a:buFont typeface="Arial" panose="020B0604020202020204" pitchFamily="34" charset="0"/>
+              <a:buChar char="•"/>
+            </a:pPr>
             <a:r>
               <a:rPr lang="fr-FR" sz="1100" smtClean="0">
                 <a:solidFill>
                   <a:schemeClr val="bg1"/>
                 </a:solidFill>
               </a:rPr>
-              <a:t> (sting)</a:t>
-            </a:r>
-            <a:endParaRPr lang="fr-FR" sz="1100" smtClean="0">
-              <a:solidFill>
-                <a:schemeClr val="bg1"/>
-              </a:solidFill>
-            </a:endParaRPr>
-          </a:p>
-          <a:p>
-            <a:pPr marL="171450" indent="-171450">
-              <a:buFont typeface="Arial" panose="020B0604020202020204" pitchFamily="34" charset="0"/>
-              <a:buChar char="•"/>
-            </a:pPr>
-            <a:r>
-              <a:rPr lang="fr-FR" sz="1100" smtClean="0">
-                <a:solidFill>
-                  <a:schemeClr val="bg1"/>
-                </a:solidFill>
-              </a:rPr>
-              <a:t>DocumentPartNumber</a:t>
-            </a:r>
-            <a:r>
-              <a:rPr lang="fr-FR" sz="1100" smtClean="0">
-                <a:solidFill>
-                  <a:schemeClr val="bg1"/>
-                </a:solidFill>
-              </a:rPr>
-              <a:t> (string)</a:t>
-            </a:r>
-            <a:endParaRPr lang="fr-FR" sz="1100" smtClean="0">
-              <a:solidFill>
-                <a:schemeClr val="bg1"/>
-              </a:solidFill>
-            </a:endParaRPr>
+              <a:t>DocumentPartNumber (string)</a:t>
+            </a:r>
           </a:p>
           <a:p>
             <a:pPr marL="171450" indent="-171450">
@@ -3887,21 +3810,22 @@
                   <a:schemeClr val="bg1"/>
                 </a:solidFill>
               </a:rPr>
-              <a:t>Date</a:t>
-            </a:r>
+              <a:t>Date (DateTime)</a:t>
+            </a:r>
+          </a:p>
+          <a:p>
+            <a:pPr marL="171450" indent="-171450">
+              <a:buFont typeface="Arial" panose="020B0604020202020204" pitchFamily="34" charset="0"/>
+              <a:buChar char="•"/>
+            </a:pPr>
             <a:r>
               <a:rPr lang="fr-FR" sz="1100" smtClean="0">
                 <a:solidFill>
                   <a:schemeClr val="bg1"/>
                 </a:solidFill>
               </a:rPr>
-              <a:t> (DateTime)</a:t>
-            </a:r>
-            <a:endParaRPr lang="fr-FR" sz="1100" smtClean="0">
-              <a:solidFill>
-                <a:schemeClr val="bg1"/>
-              </a:solidFill>
-            </a:endParaRPr>
+              <a:t>Name (string)</a:t>
+            </a:r>
           </a:p>
           <a:p>
             <a:pPr marL="171450" indent="-171450">
@@ -3913,22 +3837,25 @@
                 <a:solidFill>
                   <a:schemeClr val="bg1"/>
                 </a:solidFill>
-              </a:rPr>
-              <a:t>Name</a:t>
-            </a:r>
+                <a:sym typeface="Wingdings" panose="05000000000000000000" pitchFamily="2" charset="2"/>
+              </a:rPr>
+              <a:t>OnCertificate (bool)</a:t>
+            </a:r>
+          </a:p>
+          <a:p>
+            <a:pPr marL="171450" indent="-171450">
+              <a:buFont typeface="Arial" panose="020B0604020202020204" pitchFamily="34" charset="0"/>
+              <a:buChar char="•"/>
+            </a:pPr>
             <a:r>
               <a:rPr lang="fr-FR" sz="1100" smtClean="0">
                 <a:solidFill>
                   <a:schemeClr val="bg1"/>
                 </a:solidFill>
-              </a:rPr>
-              <a:t> (string)</a:t>
-            </a:r>
-            <a:endParaRPr lang="fr-FR" sz="1100" smtClean="0">
-              <a:solidFill>
-                <a:schemeClr val="bg1"/>
-              </a:solidFill>
-            </a:endParaRPr>
+                <a:sym typeface="Wingdings" panose="05000000000000000000" pitchFamily="2" charset="2"/>
+              </a:rPr>
+              <a:t>Document (Byte[])</a:t>
+            </a:r>
           </a:p>
           <a:p>
             <a:pPr marL="171450" indent="-171450">
@@ -3942,7 +3869,7 @@
                 </a:solidFill>
                 <a:sym typeface="Wingdings" panose="05000000000000000000" pitchFamily="2" charset="2"/>
               </a:rPr>
-              <a:t>OnCertificate (bool)</a:t>
+              <a:t>MonitoringDate (DateTime)</a:t>
             </a:r>
           </a:p>
           <a:p>
@@ -3953,54 +3880,12 @@
             <a:r>
               <a:rPr lang="fr-FR" sz="1100" smtClean="0">
                 <a:solidFill>
-                  <a:schemeClr val="bg1"/>
+                  <a:srgbClr val="FFC000"/>
                 </a:solidFill>
                 <a:sym typeface="Wingdings" panose="05000000000000000000" pitchFamily="2" charset="2"/>
               </a:rPr>
-              <a:t>Document (Byte[])</a:t>
-            </a:r>
-            <a:endParaRPr lang="fr-FR" sz="1100" smtClean="0">
-              <a:solidFill>
-                <a:schemeClr val="bg1"/>
-              </a:solidFill>
-              <a:sym typeface="Wingdings" panose="05000000000000000000" pitchFamily="2" charset="2"/>
-            </a:endParaRPr>
-          </a:p>
-          <a:p>
-            <a:pPr marL="171450" indent="-171450">
-              <a:buFont typeface="Arial" panose="020B0604020202020204" pitchFamily="34" charset="0"/>
-              <a:buChar char="•"/>
-            </a:pPr>
-            <a:r>
-              <a:rPr lang="fr-FR" sz="1100" smtClean="0">
-                <a:solidFill>
-                  <a:schemeClr val="bg1"/>
-                </a:solidFill>
-                <a:sym typeface="Wingdings" panose="05000000000000000000" pitchFamily="2" charset="2"/>
-              </a:rPr>
-              <a:t>MonitoringDate (DateTime)</a:t>
-            </a:r>
-          </a:p>
-          <a:p>
-            <a:pPr marL="171450" indent="-171450">
-              <a:buFont typeface="Arial" panose="020B0604020202020204" pitchFamily="34" charset="0"/>
-              <a:buChar char="•"/>
-            </a:pPr>
-            <a:r>
-              <a:rPr lang="fr-FR" sz="1100" smtClean="0">
-                <a:solidFill>
-                  <a:srgbClr val="FFC000"/>
-                </a:solidFill>
-                <a:sym typeface="Wingdings" panose="05000000000000000000" pitchFamily="2" charset="2"/>
-              </a:rPr>
               <a:t>MonitoringUserId (int)</a:t>
             </a:r>
-            <a:endParaRPr lang="fr-FR" sz="1100" smtClean="0">
-              <a:solidFill>
-                <a:srgbClr val="FFC000"/>
-              </a:solidFill>
-              <a:sym typeface="Wingdings" panose="05000000000000000000" pitchFamily="2" charset="2"/>
-            </a:endParaRPr>
           </a:p>
         </p:txBody>
       </p:sp>
@@ -4074,6 +3959,390 @@
           </a:fontRef>
         </p:style>
       </p:cxnSp>
+      <p:cxnSp>
+        <p:nvCxnSpPr>
+          <p:cNvPr id="3" name="Elbow Connector 2"/>
+          <p:cNvCxnSpPr>
+            <a:stCxn id="15" idx="3"/>
+          </p:cNvCxnSpPr>
+          <p:nvPr/>
+        </p:nvCxnSpPr>
+        <p:spPr>
+          <a:xfrm flipV="1">
+            <a:off x="5333995" y="2820055"/>
+            <a:ext cx="12700" cy="1228873"/>
+          </a:xfrm>
+          <a:prstGeom prst="bentConnector4">
+            <a:avLst>
+              <a:gd name="adj1" fmla="val 4875000"/>
+              <a:gd name="adj2" fmla="val 100277"/>
+            </a:avLst>
+          </a:prstGeom>
+          <a:ln>
+            <a:tailEnd type="triangle"/>
+          </a:ln>
+        </p:spPr>
+        <p:style>
+          <a:lnRef idx="1">
+            <a:schemeClr val="accent1"/>
+          </a:lnRef>
+          <a:fillRef idx="0">
+            <a:schemeClr val="accent1"/>
+          </a:fillRef>
+          <a:effectRef idx="0">
+            <a:schemeClr val="accent1"/>
+          </a:effectRef>
+          <a:fontRef idx="minor">
+            <a:schemeClr val="tx1"/>
+          </a:fontRef>
+        </p:style>
+      </p:cxnSp>
+      <p:cxnSp>
+        <p:nvCxnSpPr>
+          <p:cNvPr id="17" name="Elbow Connector 16"/>
+          <p:cNvCxnSpPr>
+            <a:stCxn id="27" idx="1"/>
+          </p:cNvCxnSpPr>
+          <p:nvPr/>
+        </p:nvCxnSpPr>
+        <p:spPr>
+          <a:xfrm rot="10800000" flipV="1">
+            <a:off x="5346695" y="1559166"/>
+            <a:ext cx="1220922" cy="415499"/>
+          </a:xfrm>
+          <a:prstGeom prst="bentConnector3">
+            <a:avLst/>
+          </a:prstGeom>
+          <a:ln>
+            <a:tailEnd type="triangle"/>
+          </a:ln>
+        </p:spPr>
+        <p:style>
+          <a:lnRef idx="1">
+            <a:schemeClr val="accent1"/>
+          </a:lnRef>
+          <a:fillRef idx="0">
+            <a:schemeClr val="accent1"/>
+          </a:fillRef>
+          <a:effectRef idx="0">
+            <a:schemeClr val="accent1"/>
+          </a:effectRef>
+          <a:fontRef idx="minor">
+            <a:schemeClr val="tx1"/>
+          </a:fontRef>
+        </p:style>
+      </p:cxnSp>
+      <p:cxnSp>
+        <p:nvCxnSpPr>
+          <p:cNvPr id="19" name="Elbow Connector 18"/>
+          <p:cNvCxnSpPr>
+            <a:stCxn id="15" idx="3"/>
+          </p:cNvCxnSpPr>
+          <p:nvPr/>
+        </p:nvCxnSpPr>
+        <p:spPr>
+          <a:xfrm flipV="1">
+            <a:off x="5333995" y="3790547"/>
+            <a:ext cx="1233621" cy="258381"/>
+          </a:xfrm>
+          <a:prstGeom prst="bentConnector3">
+            <a:avLst/>
+          </a:prstGeom>
+          <a:ln>
+            <a:tailEnd type="triangle"/>
+          </a:ln>
+        </p:spPr>
+        <p:style>
+          <a:lnRef idx="1">
+            <a:schemeClr val="accent1"/>
+          </a:lnRef>
+          <a:fillRef idx="0">
+            <a:schemeClr val="accent1"/>
+          </a:fillRef>
+          <a:effectRef idx="0">
+            <a:schemeClr val="accent1"/>
+          </a:effectRef>
+          <a:fontRef idx="minor">
+            <a:schemeClr val="tx1"/>
+          </a:fontRef>
+        </p:style>
+      </p:cxnSp>
+      <p:sp>
+        <p:nvSpPr>
+          <p:cNvPr id="26" name="TextBox 25"/>
+          <p:cNvSpPr txBox="1"/>
+          <p:nvPr/>
+        </p:nvSpPr>
+        <p:spPr>
+          <a:xfrm>
+            <a:off x="9186992" y="1428362"/>
+            <a:ext cx="1967295" cy="261610"/>
+          </a:xfrm>
+          <a:prstGeom prst="rect">
+            <a:avLst/>
+          </a:prstGeom>
+          <a:solidFill>
+            <a:schemeClr val="bg1">
+              <a:lumMod val="95000"/>
+            </a:schemeClr>
+          </a:solidFill>
+          <a:ln>
+            <a:solidFill>
+              <a:schemeClr val="bg1">
+                <a:lumMod val="50000"/>
+              </a:schemeClr>
+            </a:solidFill>
+          </a:ln>
+        </p:spPr>
+        <p:txBody>
+          <a:bodyPr wrap="square" rtlCol="0">
+            <a:spAutoFit/>
+          </a:bodyPr>
+          <a:lstStyle/>
+          <a:p>
+            <a:pPr algn="ctr"/>
+            <a:r>
+              <a:rPr lang="fr-FR" sz="1100" smtClean="0"/>
+              <a:t>Airworthiness</a:t>
+            </a:r>
+            <a:endParaRPr lang="fr-FR" sz="1100" smtClean="0"/>
+          </a:p>
+        </p:txBody>
+      </p:sp>
+      <p:sp>
+        <p:nvSpPr>
+          <p:cNvPr id="28" name="TextBox 27"/>
+          <p:cNvSpPr txBox="1"/>
+          <p:nvPr/>
+        </p:nvSpPr>
+        <p:spPr>
+          <a:xfrm>
+            <a:off x="9186991" y="1689972"/>
+            <a:ext cx="1967296" cy="2462213"/>
+          </a:xfrm>
+          <a:prstGeom prst="rect">
+            <a:avLst/>
+          </a:prstGeom>
+          <a:noFill/>
+          <a:ln>
+            <a:solidFill>
+              <a:schemeClr val="bg1">
+                <a:lumMod val="50000"/>
+              </a:schemeClr>
+            </a:solidFill>
+          </a:ln>
+        </p:spPr>
+        <p:txBody>
+          <a:bodyPr wrap="square" rtlCol="0">
+            <a:spAutoFit/>
+          </a:bodyPr>
+          <a:lstStyle/>
+          <a:p>
+            <a:pPr marL="171450" indent="-171450">
+              <a:buFont typeface="Arial" panose="020B0604020202020204" pitchFamily="34" charset="0"/>
+              <a:buChar char="•"/>
+            </a:pPr>
+            <a:r>
+              <a:rPr lang="fr-FR" sz="1100" b="1" smtClean="0">
+                <a:solidFill>
+                  <a:srgbClr val="FFC000"/>
+                </a:solidFill>
+              </a:rPr>
+              <a:t>ID (int)</a:t>
+            </a:r>
+          </a:p>
+          <a:p>
+            <a:pPr marL="171450" indent="-171450">
+              <a:buFont typeface="Arial" panose="020B0604020202020204" pitchFamily="34" charset="0"/>
+              <a:buChar char="•"/>
+            </a:pPr>
+            <a:r>
+              <a:rPr lang="fr-FR" sz="1100" smtClean="0">
+                <a:solidFill>
+                  <a:schemeClr val="bg1"/>
+                </a:solidFill>
+              </a:rPr>
+              <a:t>Type (string)</a:t>
+            </a:r>
+          </a:p>
+          <a:p>
+            <a:pPr marL="171450" indent="-171450">
+              <a:buFont typeface="Arial" panose="020B0604020202020204" pitchFamily="34" charset="0"/>
+              <a:buChar char="•"/>
+            </a:pPr>
+            <a:r>
+              <a:rPr lang="fr-FR" sz="1100" smtClean="0">
+                <a:solidFill>
+                  <a:schemeClr val="bg1"/>
+                </a:solidFill>
+              </a:rPr>
+              <a:t>Sender (string)</a:t>
+            </a:r>
+          </a:p>
+          <a:p>
+            <a:pPr marL="171450" indent="-171450">
+              <a:buFont typeface="Arial" panose="020B0604020202020204" pitchFamily="34" charset="0"/>
+              <a:buChar char="•"/>
+            </a:pPr>
+            <a:r>
+              <a:rPr lang="fr-FR" sz="1100" smtClean="0">
+                <a:solidFill>
+                  <a:schemeClr val="bg1"/>
+                </a:solidFill>
+              </a:rPr>
+              <a:t>DocumentReference (sting)</a:t>
+            </a:r>
+          </a:p>
+          <a:p>
+            <a:pPr marL="171450" indent="-171450">
+              <a:buFont typeface="Arial" panose="020B0604020202020204" pitchFamily="34" charset="0"/>
+              <a:buChar char="•"/>
+            </a:pPr>
+            <a:r>
+              <a:rPr lang="fr-FR" sz="1100" smtClean="0">
+                <a:solidFill>
+                  <a:schemeClr val="bg1"/>
+                </a:solidFill>
+              </a:rPr>
+              <a:t>DocumentPartNumber (string)</a:t>
+            </a:r>
+          </a:p>
+          <a:p>
+            <a:pPr marL="171450" indent="-171450">
+              <a:buFont typeface="Arial" panose="020B0604020202020204" pitchFamily="34" charset="0"/>
+              <a:buChar char="•"/>
+            </a:pPr>
+            <a:r>
+              <a:rPr lang="fr-FR" sz="1100" smtClean="0">
+                <a:solidFill>
+                  <a:schemeClr val="bg1"/>
+                </a:solidFill>
+              </a:rPr>
+              <a:t>Review (string)</a:t>
+            </a:r>
+            <a:endParaRPr lang="fr-FR" sz="1100" baseline="30000" smtClean="0">
+              <a:solidFill>
+                <a:schemeClr val="bg1"/>
+              </a:solidFill>
+            </a:endParaRPr>
+          </a:p>
+          <a:p>
+            <a:pPr marL="171450" indent="-171450">
+              <a:buFont typeface="Arial" panose="020B0604020202020204" pitchFamily="34" charset="0"/>
+              <a:buChar char="•"/>
+            </a:pPr>
+            <a:r>
+              <a:rPr lang="fr-FR" sz="1100" smtClean="0">
+                <a:solidFill>
+                  <a:schemeClr val="bg1"/>
+                </a:solidFill>
+              </a:rPr>
+              <a:t>Date (DateTime)</a:t>
+            </a:r>
+          </a:p>
+          <a:p>
+            <a:pPr marL="171450" indent="-171450">
+              <a:buFont typeface="Arial" panose="020B0604020202020204" pitchFamily="34" charset="0"/>
+              <a:buChar char="•"/>
+            </a:pPr>
+            <a:r>
+              <a:rPr lang="fr-FR" sz="1100" smtClean="0">
+                <a:solidFill>
+                  <a:schemeClr val="bg1"/>
+                </a:solidFill>
+              </a:rPr>
+              <a:t>Name (string</a:t>
+            </a:r>
+            <a:r>
+              <a:rPr lang="fr-FR" sz="1100" smtClean="0">
+                <a:solidFill>
+                  <a:schemeClr val="bg1"/>
+                </a:solidFill>
+              </a:rPr>
+              <a:t>)</a:t>
+            </a:r>
+          </a:p>
+          <a:p>
+            <a:pPr marL="171450" indent="-171450">
+              <a:buFont typeface="Arial" panose="020B0604020202020204" pitchFamily="34" charset="0"/>
+              <a:buChar char="•"/>
+            </a:pPr>
+            <a:r>
+              <a:rPr lang="fr-FR" sz="1100" smtClean="0">
+                <a:solidFill>
+                  <a:schemeClr val="bg1"/>
+                </a:solidFill>
+              </a:rPr>
+              <a:t>Comment (string)</a:t>
+            </a:r>
+            <a:endParaRPr lang="fr-FR" sz="1100" smtClean="0">
+              <a:solidFill>
+                <a:schemeClr val="bg1"/>
+              </a:solidFill>
+            </a:endParaRPr>
+          </a:p>
+          <a:p>
+            <a:pPr marL="171450" indent="-171450">
+              <a:buFont typeface="Arial" panose="020B0604020202020204" pitchFamily="34" charset="0"/>
+              <a:buChar char="•"/>
+            </a:pPr>
+            <a:r>
+              <a:rPr lang="fr-FR" sz="1100" smtClean="0">
+                <a:solidFill>
+                  <a:schemeClr val="bg1"/>
+                </a:solidFill>
+                <a:sym typeface="Wingdings" panose="05000000000000000000" pitchFamily="2" charset="2"/>
+              </a:rPr>
+              <a:t>OnCertificate (bool)</a:t>
+            </a:r>
+          </a:p>
+          <a:p>
+            <a:pPr marL="171450" indent="-171450">
+              <a:buFont typeface="Arial" panose="020B0604020202020204" pitchFamily="34" charset="0"/>
+              <a:buChar char="•"/>
+            </a:pPr>
+            <a:r>
+              <a:rPr lang="fr-FR" sz="1100" smtClean="0">
+                <a:solidFill>
+                  <a:schemeClr val="bg1"/>
+                </a:solidFill>
+                <a:sym typeface="Wingdings" panose="05000000000000000000" pitchFamily="2" charset="2"/>
+              </a:rPr>
+              <a:t>Document (Byte[])</a:t>
+            </a:r>
+          </a:p>
+          <a:p>
+            <a:pPr marL="171450" indent="-171450">
+              <a:buFont typeface="Arial" panose="020B0604020202020204" pitchFamily="34" charset="0"/>
+              <a:buChar char="•"/>
+            </a:pPr>
+            <a:r>
+              <a:rPr lang="fr-FR" sz="1100" smtClean="0">
+                <a:solidFill>
+                  <a:schemeClr val="bg1"/>
+                </a:solidFill>
+                <a:sym typeface="Wingdings" panose="05000000000000000000" pitchFamily="2" charset="2"/>
+              </a:rPr>
+              <a:t>MonitoringDate (DateTime)</a:t>
+            </a:r>
+          </a:p>
+          <a:p>
+            <a:pPr marL="171450" indent="-171450">
+              <a:buFont typeface="Arial" panose="020B0604020202020204" pitchFamily="34" charset="0"/>
+              <a:buChar char="•"/>
+            </a:pPr>
+            <a:r>
+              <a:rPr lang="fr-FR" sz="1100" smtClean="0">
+                <a:solidFill>
+                  <a:srgbClr val="FFC000"/>
+                </a:solidFill>
+                <a:sym typeface="Wingdings" panose="05000000000000000000" pitchFamily="2" charset="2"/>
+              </a:rPr>
+              <a:t>MonitoringUserId (int)</a:t>
+            </a:r>
+          </a:p>
+        </p:txBody>
+      </p:sp>
     </p:spTree>
     <p:extLst>
       <p:ext uri="{BB962C8B-B14F-4D97-AF65-F5344CB8AC3E}">

</xml_diff>